<commit_message>
Added the new figure: pushing perpendicular
</commit_message>
<xml_diff>
--- a/papers/Case2016/pictures/pdf/PoseControl.pptx
+++ b/papers/Case2016/pictures/pdf/PoseControl.pptx
@@ -3544,6 +3544,36 @@
       </p:grpSpPr>
       <p:pic>
         <p:nvPicPr>
+          <p:cNvPr id="143" name="Picture 142" descr="Pose5.png"/>
+          <p:cNvPicPr>
+            <a:picLocks noChangeAspect="1"/>
+          </p:cNvPicPr>
+          <p:nvPr/>
+        </p:nvPicPr>
+        <p:blipFill>
+          <a:blip r:embed="rId3">
+            <a:extLst>
+              <a:ext uri="{28A0092B-C50C-407E-A947-70E740481C1C}">
+                <a14:useLocalDpi xmlns:a14="http://schemas.microsoft.com/office/drawing/2010/main" val="0"/>
+              </a:ext>
+            </a:extLst>
+          </a:blip>
+          <a:stretch>
+            <a:fillRect/>
+          </a:stretch>
+        </p:blipFill>
+        <p:spPr>
+          <a:xfrm>
+            <a:off x="12303253" y="-21173"/>
+            <a:ext cx="6536157" cy="3678773"/>
+          </a:xfrm>
+          <a:prstGeom prst="rect">
+            <a:avLst/>
+          </a:prstGeom>
+        </p:spPr>
+      </p:pic>
+      <p:pic>
+        <p:nvPicPr>
           <p:cNvPr id="116" name="Picture 115" descr="Pose1.png"/>
           <p:cNvPicPr>
             <a:picLocks noChangeAspect="1"/>
@@ -3551,7 +3581,7 @@
           <p:nvPr/>
         </p:nvPicPr>
         <p:blipFill>
-          <a:blip r:embed="rId3">
+          <a:blip r:embed="rId4">
             <a:extLst>
               <a:ext uri="{28A0092B-C50C-407E-A947-70E740481C1C}">
                 <a14:useLocalDpi xmlns:a14="http://schemas.microsoft.com/office/drawing/2010/main" val="0"/>
@@ -3581,7 +3611,7 @@
           <p:nvPr/>
         </p:nvPicPr>
         <p:blipFill>
-          <a:blip r:embed="rId4">
+          <a:blip r:embed="rId5">
             <a:extLst>
               <a:ext uri="{28A0092B-C50C-407E-A947-70E740481C1C}">
                 <a14:useLocalDpi xmlns:a14="http://schemas.microsoft.com/office/drawing/2010/main" val="0"/>
@@ -3611,7 +3641,7 @@
           <p:nvPr/>
         </p:nvPicPr>
         <p:blipFill>
-          <a:blip r:embed="rId5">
+          <a:blip r:embed="rId6">
             <a:extLst>
               <a:ext uri="{28A0092B-C50C-407E-A947-70E740481C1C}">
                 <a14:useLocalDpi xmlns:a14="http://schemas.microsoft.com/office/drawing/2010/main" val="0"/>
@@ -3641,7 +3671,7 @@
           <p:nvPr/>
         </p:nvPicPr>
         <p:blipFill>
-          <a:blip r:embed="rId6">
+          <a:blip r:embed="rId7">
             <a:extLst>
               <a:ext uri="{28A0092B-C50C-407E-A947-70E740481C1C}">
                 <a14:useLocalDpi xmlns:a14="http://schemas.microsoft.com/office/drawing/2010/main" val="0"/>
@@ -3656,36 +3686,6 @@
           <a:xfrm>
             <a:off x="8866095" y="0"/>
             <a:ext cx="3437158" cy="3657600"/>
-          </a:xfrm>
-          <a:prstGeom prst="rect">
-            <a:avLst/>
-          </a:prstGeom>
-        </p:spPr>
-      </p:pic>
-      <p:pic>
-        <p:nvPicPr>
-          <p:cNvPr id="120" name="Picture 119" descr="Pose5.png"/>
-          <p:cNvPicPr>
-            <a:picLocks noChangeAspect="1"/>
-          </p:cNvPicPr>
-          <p:nvPr/>
-        </p:nvPicPr>
-        <p:blipFill>
-          <a:blip r:embed="rId7">
-            <a:extLst>
-              <a:ext uri="{28A0092B-C50C-407E-A947-70E740481C1C}">
-                <a14:useLocalDpi xmlns:a14="http://schemas.microsoft.com/office/drawing/2010/main" val="0"/>
-              </a:ext>
-            </a:extLst>
-          </a:blip>
-          <a:stretch>
-            <a:fillRect/>
-          </a:stretch>
-        </p:blipFill>
-        <p:spPr>
-          <a:xfrm>
-            <a:off x="12303253" y="0"/>
-            <a:ext cx="6492747" cy="3657600"/>
           </a:xfrm>
           <a:prstGeom prst="rect">
             <a:avLst/>

</xml_diff>